<commit_message>
adding final updates to presentation
</commit_message>
<xml_diff>
--- a/BraincellsP2_Presentation.pptx
+++ b/BraincellsP2_Presentation.pptx
@@ -252,6 +252,11 @@
       </a:defRPr>
     </a:lvl9pPr>
   </p:defaultTextStyle>
+  <p:extLst>
+    <p:ext uri="{EFAFB233-063F-42B5-8137-9DF3F51BA10A}">
+      <p15:sldGuideLst xmlns:p15="http://schemas.microsoft.com/office/powerpoint/2012/main"/>
+    </p:ext>
+  </p:extLst>
 </p:presentation>
 </file>
 
@@ -27869,7 +27874,47 @@
           <a:bodyPr/>
           <a:lstStyle/>
           <a:p>
-            <a:endParaRPr lang="en-US"/>
+            <a:r>
+              <a:rPr lang="en-US" dirty="0"/>
+              <a:t>As much as we would like to boast that our application is capable of it all…</a:t>
+            </a:r>
+          </a:p>
+          <a:p>
+            <a:pPr lvl="1">
+              <a:lnSpc>
+                <a:spcPct val="200000"/>
+              </a:lnSpc>
+            </a:pPr>
+            <a:r>
+              <a:rPr lang="en-US" dirty="0"/>
+              <a:t>Application is limited to pre-created csv file</a:t>
+            </a:r>
+          </a:p>
+          <a:p>
+            <a:pPr lvl="1">
+              <a:lnSpc>
+                <a:spcPct val="200000"/>
+              </a:lnSpc>
+            </a:pPr>
+            <a:r>
+              <a:rPr lang="en-US" dirty="0"/>
+              <a:t>Limited flexibility and rigid features.</a:t>
+            </a:r>
+          </a:p>
+          <a:p>
+            <a:pPr lvl="1">
+              <a:lnSpc>
+                <a:spcPct val="200000"/>
+              </a:lnSpc>
+            </a:pPr>
+            <a:r>
+              <a:rPr lang="en-US" dirty="0"/>
+              <a:t>Some manual transforms done outside of ETL. </a:t>
+            </a:r>
+            <a:br>
+              <a:rPr lang="en-US" dirty="0"/>
+            </a:br>
+            <a:endParaRPr lang="en-US" dirty="0"/>
           </a:p>
         </p:txBody>
       </p:sp>
@@ -27985,12 +28030,41 @@
             <p:ph type="body" idx="1"/>
           </p:nvPr>
         </p:nvSpPr>
-        <p:spPr/>
+        <p:spPr>
+          <a:xfrm>
+            <a:off x="301353" y="1678092"/>
+            <a:ext cx="4321120" cy="2362967"/>
+          </a:xfrm>
+        </p:spPr>
         <p:txBody>
-          <a:bodyPr/>
+          <a:bodyPr numCol="1"/>
           <a:lstStyle/>
           <a:p>
-            <a:endParaRPr lang="en-US"/>
+            <a:r>
+              <a:rPr lang="en-US" u="sng" dirty="0"/>
+              <a:t>Front End </a:t>
+            </a:r>
+          </a:p>
+          <a:p>
+            <a:pPr lvl="1"/>
+            <a:r>
+              <a:rPr lang="en-US" dirty="0"/>
+              <a:t>JavaScript redirects </a:t>
+            </a:r>
+          </a:p>
+          <a:p>
+            <a:pPr lvl="1"/>
+            <a:r>
+              <a:rPr lang="en-US" dirty="0"/>
+              <a:t>Button Functions</a:t>
+            </a:r>
+          </a:p>
+          <a:p>
+            <a:pPr lvl="1"/>
+            <a:r>
+              <a:rPr lang="en-US" dirty="0"/>
+              <a:t>Chart Sizing/Placement</a:t>
+            </a:r>
           </a:p>
         </p:txBody>
       </p:sp>
@@ -28029,6 +28103,691 @@
               <a:t>10</a:t>
             </a:fld>
             <a:endParaRPr lang="en-US"/>
+          </a:p>
+        </p:txBody>
+      </p:sp>
+      <p:sp>
+        <p:nvSpPr>
+          <p:cNvPr id="5" name="TextBox 4">
+            <a:extLst>
+              <a:ext uri="{FF2B5EF4-FFF2-40B4-BE49-F238E27FC236}">
+                <a16:creationId xmlns:a16="http://schemas.microsoft.com/office/drawing/2014/main" id="{E80A3FFF-302F-4FC1-8352-4B595DCC4681}"/>
+              </a:ext>
+            </a:extLst>
+          </p:cNvPr>
+          <p:cNvSpPr txBox="1"/>
+          <p:nvPr/>
+        </p:nvSpPr>
+        <p:spPr>
+          <a:xfrm>
+            <a:off x="4701131" y="1840065"/>
+            <a:ext cx="3736256" cy="2039020"/>
+          </a:xfrm>
+          <a:prstGeom prst="rect">
+            <a:avLst/>
+          </a:prstGeom>
+          <a:noFill/>
+        </p:spPr>
+        <p:txBody>
+          <a:bodyPr wrap="square" rtlCol="0">
+            <a:spAutoFit/>
+          </a:bodyPr>
+          <a:lstStyle/>
+          <a:p>
+            <a:pPr marL="457200" marR="0" lvl="0" indent="-406400" algn="l" defTabSz="914400" rtl="0" eaLnBrk="1" fontAlgn="auto" latinLnBrk="0" hangingPunct="1">
+              <a:lnSpc>
+                <a:spcPct val="100000"/>
+              </a:lnSpc>
+              <a:spcBef>
+                <a:spcPts val="560"/>
+              </a:spcBef>
+              <a:spcAft>
+                <a:spcPts val="0"/>
+              </a:spcAft>
+              <a:buClr>
+                <a:srgbClr val="F36A25"/>
+              </a:buClr>
+              <a:buSzPts val="2800"/>
+              <a:buFont typeface="Arial"/>
+              <a:buChar char="•"/>
+              <a:tabLst/>
+              <a:defRPr/>
+            </a:pPr>
+            <a:r>
+              <a:rPr kumimoji="0" lang="en-US" sz="2800" b="0" i="0" u="sng" strike="noStrike" kern="0" cap="none" spc="0" normalizeH="0" baseline="0" noProof="0" dirty="0">
+                <a:ln>
+                  <a:noFill/>
+                </a:ln>
+                <a:solidFill>
+                  <a:srgbClr val="474C55"/>
+                </a:solidFill>
+                <a:effectLst/>
+                <a:uLnTx/>
+                <a:uFillTx/>
+                <a:latin typeface="Arial"/>
+                <a:cs typeface="Arial"/>
+                <a:sym typeface="Arial"/>
+              </a:rPr>
+              <a:t> Back End </a:t>
+            </a:r>
+          </a:p>
+          <a:p>
+            <a:pPr marL="914400" marR="0" lvl="1" indent="-381000" algn="l" defTabSz="914400" rtl="0" eaLnBrk="1" fontAlgn="auto" latinLnBrk="0" hangingPunct="1">
+              <a:lnSpc>
+                <a:spcPct val="100000"/>
+              </a:lnSpc>
+              <a:spcBef>
+                <a:spcPts val="480"/>
+              </a:spcBef>
+              <a:spcAft>
+                <a:spcPts val="0"/>
+              </a:spcAft>
+              <a:buClr>
+                <a:srgbClr val="F36A25"/>
+              </a:buClr>
+              <a:buSzPts val="2400"/>
+              <a:buFont typeface="Arial"/>
+              <a:buChar char="–"/>
+              <a:tabLst/>
+              <a:defRPr/>
+            </a:pPr>
+            <a:r>
+              <a:rPr kumimoji="0" lang="en-US" sz="2400" b="0" i="0" u="none" strike="noStrike" kern="0" cap="none" spc="0" normalizeH="0" baseline="0" noProof="0" dirty="0">
+                <a:ln>
+                  <a:noFill/>
+                </a:ln>
+                <a:solidFill>
+                  <a:srgbClr val="474C55"/>
+                </a:solidFill>
+                <a:effectLst/>
+                <a:uLnTx/>
+                <a:uFillTx/>
+                <a:latin typeface="Arial"/>
+                <a:cs typeface="Arial"/>
+                <a:sym typeface="Arial"/>
+              </a:rPr>
+              <a:t>Authentication</a:t>
+            </a:r>
+          </a:p>
+          <a:p>
+            <a:pPr marL="914400" marR="0" lvl="1" indent="-381000" algn="l" defTabSz="914400" rtl="0" eaLnBrk="1" fontAlgn="auto" latinLnBrk="0" hangingPunct="1">
+              <a:lnSpc>
+                <a:spcPct val="100000"/>
+              </a:lnSpc>
+              <a:spcBef>
+                <a:spcPts val="480"/>
+              </a:spcBef>
+              <a:spcAft>
+                <a:spcPts val="0"/>
+              </a:spcAft>
+              <a:buClr>
+                <a:srgbClr val="F36A25"/>
+              </a:buClr>
+              <a:buSzPts val="2400"/>
+              <a:buFont typeface="Arial"/>
+              <a:buChar char="–"/>
+              <a:tabLst/>
+              <a:defRPr/>
+            </a:pPr>
+            <a:r>
+              <a:rPr lang="en-US" sz="2400" dirty="0">
+                <a:solidFill>
+                  <a:srgbClr val="474C55"/>
+                </a:solidFill>
+              </a:rPr>
+              <a:t>JPA Repo Queries</a:t>
+            </a:r>
+          </a:p>
+          <a:p>
+            <a:pPr marL="914400" marR="0" lvl="1" indent="-381000" algn="l" defTabSz="914400" rtl="0" eaLnBrk="1" fontAlgn="auto" latinLnBrk="0" hangingPunct="1">
+              <a:lnSpc>
+                <a:spcPct val="100000"/>
+              </a:lnSpc>
+              <a:spcBef>
+                <a:spcPts val="480"/>
+              </a:spcBef>
+              <a:spcAft>
+                <a:spcPts val="0"/>
+              </a:spcAft>
+              <a:buClr>
+                <a:srgbClr val="F36A25"/>
+              </a:buClr>
+              <a:buSzPts val="2400"/>
+              <a:buFont typeface="Arial"/>
+              <a:buChar char="–"/>
+              <a:tabLst/>
+              <a:defRPr/>
+            </a:pPr>
+            <a:r>
+              <a:rPr kumimoji="0" lang="en-US" sz="2400" b="0" i="0" u="none" strike="noStrike" kern="0" cap="none" spc="0" normalizeH="0" baseline="0" noProof="0" dirty="0">
+                <a:ln>
+                  <a:noFill/>
+                </a:ln>
+                <a:solidFill>
+                  <a:srgbClr val="474C55"/>
+                </a:solidFill>
+                <a:effectLst/>
+                <a:uLnTx/>
+                <a:uFillTx/>
+                <a:latin typeface="Arial"/>
+                <a:cs typeface="Arial"/>
+                <a:sym typeface="Arial"/>
+              </a:rPr>
+              <a:t>Table 4 </a:t>
+            </a:r>
+          </a:p>
+          <a:p>
+            <a:endParaRPr lang="en-US" dirty="0"/>
+          </a:p>
+        </p:txBody>
+      </p:sp>
+      <p:sp>
+        <p:nvSpPr>
+          <p:cNvPr id="6" name="Text Placeholder 2">
+            <a:extLst>
+              <a:ext uri="{FF2B5EF4-FFF2-40B4-BE49-F238E27FC236}">
+                <a16:creationId xmlns:a16="http://schemas.microsoft.com/office/drawing/2014/main" id="{BCAF45F7-C407-4E21-86B1-9D8B60496E8D}"/>
+              </a:ext>
+            </a:extLst>
+          </p:cNvPr>
+          <p:cNvSpPr txBox="1">
+            <a:spLocks/>
+          </p:cNvSpPr>
+          <p:nvPr/>
+        </p:nvSpPr>
+        <p:spPr>
+          <a:xfrm>
+            <a:off x="380011" y="3844413"/>
+            <a:ext cx="4034674" cy="2362967"/>
+          </a:xfrm>
+          <a:prstGeom prst="rect">
+            <a:avLst/>
+          </a:prstGeom>
+          <a:noFill/>
+          <a:ln>
+            <a:noFill/>
+          </a:ln>
+        </p:spPr>
+        <p:txBody>
+          <a:bodyPr spcFirstLastPara="1" wrap="square" lIns="91425" tIns="91425" rIns="91425" bIns="91425" numCol="1" anchor="t" anchorCtr="0">
+            <a:noAutofit/>
+          </a:bodyPr>
+          <a:lstStyle>
+            <a:defPPr marR="0" lvl="0" algn="l" rtl="0">
+              <a:lnSpc>
+                <a:spcPct val="100000"/>
+              </a:lnSpc>
+              <a:spcBef>
+                <a:spcPts val="0"/>
+              </a:spcBef>
+              <a:spcAft>
+                <a:spcPts val="0"/>
+              </a:spcAft>
+            </a:defPPr>
+            <a:lvl1pPr marL="457200" marR="0" lvl="0" indent="-406400" algn="l" rtl="0">
+              <a:lnSpc>
+                <a:spcPct val="100000"/>
+              </a:lnSpc>
+              <a:spcBef>
+                <a:spcPts val="560"/>
+              </a:spcBef>
+              <a:spcAft>
+                <a:spcPts val="0"/>
+              </a:spcAft>
+              <a:buClr>
+                <a:schemeClr val="accent1"/>
+              </a:buClr>
+              <a:buSzPts val="2800"/>
+              <a:buFont typeface="Arial"/>
+              <a:buChar char="•"/>
+              <a:defRPr sz="2800" b="0" i="0" u="none" strike="noStrike" cap="none">
+                <a:solidFill>
+                  <a:schemeClr val="dk2"/>
+                </a:solidFill>
+                <a:latin typeface="Arial"/>
+                <a:ea typeface="Arial"/>
+                <a:cs typeface="Arial"/>
+                <a:sym typeface="Arial"/>
+              </a:defRPr>
+            </a:lvl1pPr>
+            <a:lvl2pPr marL="914400" marR="0" lvl="1" indent="-381000" algn="l" rtl="0">
+              <a:lnSpc>
+                <a:spcPct val="100000"/>
+              </a:lnSpc>
+              <a:spcBef>
+                <a:spcPts val="480"/>
+              </a:spcBef>
+              <a:spcAft>
+                <a:spcPts val="0"/>
+              </a:spcAft>
+              <a:buClr>
+                <a:schemeClr val="accent1"/>
+              </a:buClr>
+              <a:buSzPts val="2400"/>
+              <a:buFont typeface="Arial"/>
+              <a:buChar char="–"/>
+              <a:defRPr sz="2400" b="0" i="0" u="none" strike="noStrike" cap="none">
+                <a:solidFill>
+                  <a:schemeClr val="dk2"/>
+                </a:solidFill>
+                <a:latin typeface="Arial"/>
+                <a:ea typeface="Arial"/>
+                <a:cs typeface="Arial"/>
+                <a:sym typeface="Arial"/>
+              </a:defRPr>
+            </a:lvl2pPr>
+            <a:lvl3pPr marL="1371600" marR="0" lvl="2" indent="-355600" algn="l" rtl="0">
+              <a:lnSpc>
+                <a:spcPct val="100000"/>
+              </a:lnSpc>
+              <a:spcBef>
+                <a:spcPts val="400"/>
+              </a:spcBef>
+              <a:spcAft>
+                <a:spcPts val="0"/>
+              </a:spcAft>
+              <a:buClr>
+                <a:schemeClr val="accent1"/>
+              </a:buClr>
+              <a:buSzPts val="2000"/>
+              <a:buFont typeface="Arial"/>
+              <a:buChar char="•"/>
+              <a:defRPr sz="2000" b="0" i="0" u="none" strike="noStrike" cap="none">
+                <a:solidFill>
+                  <a:schemeClr val="dk2"/>
+                </a:solidFill>
+                <a:latin typeface="Arial"/>
+                <a:ea typeface="Arial"/>
+                <a:cs typeface="Arial"/>
+                <a:sym typeface="Arial"/>
+              </a:defRPr>
+            </a:lvl3pPr>
+            <a:lvl4pPr marL="1828800" marR="0" lvl="3" indent="-342900" algn="l" rtl="0">
+              <a:lnSpc>
+                <a:spcPct val="100000"/>
+              </a:lnSpc>
+              <a:spcBef>
+                <a:spcPts val="360"/>
+              </a:spcBef>
+              <a:spcAft>
+                <a:spcPts val="0"/>
+              </a:spcAft>
+              <a:buClr>
+                <a:schemeClr val="accent1"/>
+              </a:buClr>
+              <a:buSzPts val="1800"/>
+              <a:buFont typeface="Arial"/>
+              <a:buChar char="–"/>
+              <a:defRPr sz="1800" b="0" i="0" u="none" strike="noStrike" cap="none">
+                <a:solidFill>
+                  <a:schemeClr val="dk2"/>
+                </a:solidFill>
+                <a:latin typeface="Arial"/>
+                <a:ea typeface="Arial"/>
+                <a:cs typeface="Arial"/>
+                <a:sym typeface="Arial"/>
+              </a:defRPr>
+            </a:lvl4pPr>
+            <a:lvl5pPr marL="2286000" marR="0" lvl="4" indent="-342900" algn="l" rtl="0">
+              <a:lnSpc>
+                <a:spcPct val="100000"/>
+              </a:lnSpc>
+              <a:spcBef>
+                <a:spcPts val="360"/>
+              </a:spcBef>
+              <a:spcAft>
+                <a:spcPts val="0"/>
+              </a:spcAft>
+              <a:buClr>
+                <a:schemeClr val="accent1"/>
+              </a:buClr>
+              <a:buSzPts val="1800"/>
+              <a:buFont typeface="Arial"/>
+              <a:buChar char="»"/>
+              <a:defRPr sz="1800" b="0" i="0" u="none" strike="noStrike" cap="none">
+                <a:solidFill>
+                  <a:schemeClr val="dk2"/>
+                </a:solidFill>
+                <a:latin typeface="Arial"/>
+                <a:ea typeface="Arial"/>
+                <a:cs typeface="Arial"/>
+                <a:sym typeface="Arial"/>
+              </a:defRPr>
+            </a:lvl5pPr>
+            <a:lvl6pPr marL="2743200" marR="0" lvl="5" indent="-355600" algn="l" rtl="0">
+              <a:lnSpc>
+                <a:spcPct val="100000"/>
+              </a:lnSpc>
+              <a:spcBef>
+                <a:spcPts val="400"/>
+              </a:spcBef>
+              <a:spcAft>
+                <a:spcPts val="0"/>
+              </a:spcAft>
+              <a:buClr>
+                <a:schemeClr val="dk1"/>
+              </a:buClr>
+              <a:buSzPts val="2000"/>
+              <a:buFont typeface="Arial"/>
+              <a:buChar char="•"/>
+              <a:defRPr sz="2000" b="0" i="0" u="none" strike="noStrike" cap="none">
+                <a:solidFill>
+                  <a:schemeClr val="dk1"/>
+                </a:solidFill>
+                <a:latin typeface="Arial"/>
+                <a:ea typeface="Arial"/>
+                <a:cs typeface="Arial"/>
+                <a:sym typeface="Arial"/>
+              </a:defRPr>
+            </a:lvl6pPr>
+            <a:lvl7pPr marL="3200400" marR="0" lvl="6" indent="-355600" algn="l" rtl="0">
+              <a:lnSpc>
+                <a:spcPct val="100000"/>
+              </a:lnSpc>
+              <a:spcBef>
+                <a:spcPts val="400"/>
+              </a:spcBef>
+              <a:spcAft>
+                <a:spcPts val="0"/>
+              </a:spcAft>
+              <a:buClr>
+                <a:schemeClr val="dk1"/>
+              </a:buClr>
+              <a:buSzPts val="2000"/>
+              <a:buFont typeface="Arial"/>
+              <a:buChar char="•"/>
+              <a:defRPr sz="2000" b="0" i="0" u="none" strike="noStrike" cap="none">
+                <a:solidFill>
+                  <a:schemeClr val="dk1"/>
+                </a:solidFill>
+                <a:latin typeface="Arial"/>
+                <a:ea typeface="Arial"/>
+                <a:cs typeface="Arial"/>
+                <a:sym typeface="Arial"/>
+              </a:defRPr>
+            </a:lvl7pPr>
+            <a:lvl8pPr marL="3657600" marR="0" lvl="7" indent="-355600" algn="l" rtl="0">
+              <a:lnSpc>
+                <a:spcPct val="100000"/>
+              </a:lnSpc>
+              <a:spcBef>
+                <a:spcPts val="400"/>
+              </a:spcBef>
+              <a:spcAft>
+                <a:spcPts val="0"/>
+              </a:spcAft>
+              <a:buClr>
+                <a:schemeClr val="dk1"/>
+              </a:buClr>
+              <a:buSzPts val="2000"/>
+              <a:buFont typeface="Arial"/>
+              <a:buChar char="•"/>
+              <a:defRPr sz="2000" b="0" i="0" u="none" strike="noStrike" cap="none">
+                <a:solidFill>
+                  <a:schemeClr val="dk1"/>
+                </a:solidFill>
+                <a:latin typeface="Arial"/>
+                <a:ea typeface="Arial"/>
+                <a:cs typeface="Arial"/>
+                <a:sym typeface="Arial"/>
+              </a:defRPr>
+            </a:lvl8pPr>
+            <a:lvl9pPr marL="4114800" marR="0" lvl="8" indent="-355600" algn="l" rtl="0">
+              <a:lnSpc>
+                <a:spcPct val="100000"/>
+              </a:lnSpc>
+              <a:spcBef>
+                <a:spcPts val="400"/>
+              </a:spcBef>
+              <a:spcAft>
+                <a:spcPts val="0"/>
+              </a:spcAft>
+              <a:buClr>
+                <a:schemeClr val="dk1"/>
+              </a:buClr>
+              <a:buSzPts val="2000"/>
+              <a:buFont typeface="Arial"/>
+              <a:buChar char="•"/>
+              <a:defRPr sz="2000" b="0" i="0" u="none" strike="noStrike" cap="none">
+                <a:solidFill>
+                  <a:schemeClr val="dk1"/>
+                </a:solidFill>
+                <a:latin typeface="Arial"/>
+                <a:ea typeface="Arial"/>
+                <a:cs typeface="Arial"/>
+                <a:sym typeface="Arial"/>
+              </a:defRPr>
+            </a:lvl9pPr>
+          </a:lstStyle>
+          <a:p>
+            <a:r>
+              <a:rPr lang="en-US" u="sng" dirty="0"/>
+              <a:t>Talend</a:t>
+            </a:r>
+          </a:p>
+          <a:p>
+            <a:pPr lvl="1"/>
+            <a:r>
+              <a:rPr lang="en-US" dirty="0"/>
+              <a:t>tMap inconsistencies</a:t>
+            </a:r>
+          </a:p>
+          <a:p>
+            <a:pPr lvl="1"/>
+            <a:r>
+              <a:rPr lang="en-US" dirty="0"/>
+              <a:t>Data cleaning trial and error</a:t>
+            </a:r>
+          </a:p>
+          <a:p>
+            <a:pPr lvl="1"/>
+            <a:r>
+              <a:rPr lang="en-US" dirty="0"/>
+              <a:t>Connection Lines</a:t>
+            </a:r>
+          </a:p>
+          <a:p>
+            <a:pPr lvl="1"/>
+            <a:endParaRPr lang="en-US" dirty="0"/>
+          </a:p>
+          <a:p>
+            <a:pPr lvl="1"/>
+            <a:endParaRPr lang="en-US" dirty="0"/>
+          </a:p>
+          <a:p>
+            <a:pPr lvl="1"/>
+            <a:endParaRPr lang="en-US" dirty="0"/>
+          </a:p>
+          <a:p>
+            <a:pPr lvl="1"/>
+            <a:endParaRPr lang="en-US" dirty="0"/>
+          </a:p>
+          <a:p>
+            <a:pPr lvl="1"/>
+            <a:endParaRPr lang="en-US" dirty="0"/>
+          </a:p>
+          <a:p>
+            <a:pPr lvl="1"/>
+            <a:endParaRPr lang="en-US" dirty="0"/>
+          </a:p>
+          <a:p>
+            <a:pPr lvl="1"/>
+            <a:endParaRPr lang="en-US" dirty="0"/>
+          </a:p>
+        </p:txBody>
+      </p:sp>
+      <p:sp>
+        <p:nvSpPr>
+          <p:cNvPr id="7" name="TextBox 6">
+            <a:extLst>
+              <a:ext uri="{FF2B5EF4-FFF2-40B4-BE49-F238E27FC236}">
+                <a16:creationId xmlns:a16="http://schemas.microsoft.com/office/drawing/2014/main" id="{7CADBB91-5A53-49FF-9EAD-5308C4343E14}"/>
+              </a:ext>
+            </a:extLst>
+          </p:cNvPr>
+          <p:cNvSpPr txBox="1"/>
+          <p:nvPr/>
+        </p:nvSpPr>
+        <p:spPr>
+          <a:xfrm>
+            <a:off x="4622473" y="4099327"/>
+            <a:ext cx="3736257" cy="2039020"/>
+          </a:xfrm>
+          <a:prstGeom prst="rect">
+            <a:avLst/>
+          </a:prstGeom>
+          <a:noFill/>
+        </p:spPr>
+        <p:txBody>
+          <a:bodyPr wrap="square" rtlCol="0">
+            <a:spAutoFit/>
+          </a:bodyPr>
+          <a:lstStyle/>
+          <a:p>
+            <a:pPr marL="457200" marR="0" lvl="0" indent="-406400" algn="l" defTabSz="914400" rtl="0" eaLnBrk="1" fontAlgn="auto" latinLnBrk="0" hangingPunct="1">
+              <a:lnSpc>
+                <a:spcPct val="100000"/>
+              </a:lnSpc>
+              <a:spcBef>
+                <a:spcPts val="560"/>
+              </a:spcBef>
+              <a:spcAft>
+                <a:spcPts val="0"/>
+              </a:spcAft>
+              <a:buClr>
+                <a:srgbClr val="F36A25"/>
+              </a:buClr>
+              <a:buSzPts val="2800"/>
+              <a:buFont typeface="Arial"/>
+              <a:buChar char="•"/>
+              <a:tabLst/>
+              <a:defRPr/>
+            </a:pPr>
+            <a:r>
+              <a:rPr kumimoji="0" lang="en-US" sz="2800" b="0" i="0" u="sng" strike="noStrike" kern="0" cap="none" spc="0" normalizeH="0" baseline="0" noProof="0" dirty="0">
+                <a:ln>
+                  <a:noFill/>
+                </a:ln>
+                <a:solidFill>
+                  <a:srgbClr val="474C55"/>
+                </a:solidFill>
+                <a:effectLst/>
+                <a:uLnTx/>
+                <a:uFillTx/>
+                <a:latin typeface="Arial"/>
+                <a:cs typeface="Arial"/>
+                <a:sym typeface="Arial"/>
+              </a:rPr>
+              <a:t>Version Control</a:t>
+            </a:r>
+          </a:p>
+          <a:p>
+            <a:pPr marL="914400" marR="0" lvl="1" indent="-381000" algn="l" defTabSz="914400" rtl="0" eaLnBrk="1" fontAlgn="auto" latinLnBrk="0" hangingPunct="1">
+              <a:lnSpc>
+                <a:spcPct val="100000"/>
+              </a:lnSpc>
+              <a:spcBef>
+                <a:spcPts val="480"/>
+              </a:spcBef>
+              <a:spcAft>
+                <a:spcPts val="0"/>
+              </a:spcAft>
+              <a:buClr>
+                <a:srgbClr val="F36A25"/>
+              </a:buClr>
+              <a:buSzPts val="2400"/>
+              <a:buFont typeface="Arial"/>
+              <a:buChar char="–"/>
+              <a:tabLst/>
+              <a:defRPr/>
+            </a:pPr>
+            <a:r>
+              <a:rPr kumimoji="0" lang="en-US" sz="2400" b="0" i="0" u="none" strike="noStrike" kern="0" cap="none" spc="0" normalizeH="0" baseline="0" noProof="0" dirty="0">
+                <a:ln>
+                  <a:noFill/>
+                </a:ln>
+                <a:solidFill>
+                  <a:srgbClr val="474C55"/>
+                </a:solidFill>
+                <a:effectLst/>
+                <a:uLnTx/>
+                <a:uFillTx/>
+                <a:latin typeface="Arial"/>
+                <a:cs typeface="Arial"/>
+                <a:sym typeface="Arial"/>
+              </a:rPr>
+              <a:t>Push/Pull Conflicts</a:t>
+            </a:r>
+          </a:p>
+          <a:p>
+            <a:pPr marL="914400" marR="0" lvl="1" indent="-381000" algn="l" defTabSz="914400" rtl="0" eaLnBrk="1" fontAlgn="auto" latinLnBrk="0" hangingPunct="1">
+              <a:lnSpc>
+                <a:spcPct val="100000"/>
+              </a:lnSpc>
+              <a:spcBef>
+                <a:spcPts val="480"/>
+              </a:spcBef>
+              <a:spcAft>
+                <a:spcPts val="0"/>
+              </a:spcAft>
+              <a:buClr>
+                <a:srgbClr val="F36A25"/>
+              </a:buClr>
+              <a:buSzPts val="2400"/>
+              <a:buFont typeface="Arial"/>
+              <a:buChar char="–"/>
+              <a:tabLst/>
+              <a:defRPr/>
+            </a:pPr>
+            <a:r>
+              <a:rPr lang="en-US" sz="2400" dirty="0">
+                <a:solidFill>
+                  <a:srgbClr val="474C55"/>
+                </a:solidFill>
+              </a:rPr>
+              <a:t>Merges</a:t>
+            </a:r>
+          </a:p>
+          <a:p>
+            <a:pPr marL="914400" marR="0" lvl="1" indent="-381000" algn="l" defTabSz="914400" rtl="0" eaLnBrk="1" fontAlgn="auto" latinLnBrk="0" hangingPunct="1">
+              <a:lnSpc>
+                <a:spcPct val="100000"/>
+              </a:lnSpc>
+              <a:spcBef>
+                <a:spcPts val="480"/>
+              </a:spcBef>
+              <a:spcAft>
+                <a:spcPts val="0"/>
+              </a:spcAft>
+              <a:buClr>
+                <a:srgbClr val="F36A25"/>
+              </a:buClr>
+              <a:buSzPts val="2400"/>
+              <a:buFont typeface="Arial"/>
+              <a:buChar char="–"/>
+              <a:tabLst/>
+              <a:defRPr/>
+            </a:pPr>
+            <a:r>
+              <a:rPr kumimoji="0" lang="en-US" sz="2400" b="0" i="0" u="none" strike="noStrike" kern="0" cap="none" spc="0" normalizeH="0" baseline="0" noProof="0" dirty="0">
+                <a:ln>
+                  <a:noFill/>
+                </a:ln>
+                <a:solidFill>
+                  <a:srgbClr val="474C55"/>
+                </a:solidFill>
+                <a:effectLst/>
+                <a:uLnTx/>
+                <a:uFillTx/>
+                <a:latin typeface="Arial"/>
+                <a:cs typeface="Arial"/>
+                <a:sym typeface="Arial"/>
+              </a:rPr>
+              <a:t>Branching</a:t>
+            </a:r>
+          </a:p>
+          <a:p>
+            <a:endParaRPr lang="en-US" dirty="0"/>
           </a:p>
         </p:txBody>
       </p:sp>
@@ -29311,31 +30070,6 @@
       </p:sp>
       <p:sp>
         <p:nvSpPr>
-          <p:cNvPr id="3" name="Text Placeholder 2">
-            <a:extLst>
-              <a:ext uri="{FF2B5EF4-FFF2-40B4-BE49-F238E27FC236}">
-                <a16:creationId xmlns:a16="http://schemas.microsoft.com/office/drawing/2014/main" id="{D64A3509-C188-4412-844B-D87DBAF4A285}"/>
-              </a:ext>
-            </a:extLst>
-          </p:cNvPr>
-          <p:cNvSpPr>
-            <a:spLocks noGrp="1"/>
-          </p:cNvSpPr>
-          <p:nvPr>
-            <p:ph type="body" idx="1"/>
-          </p:nvPr>
-        </p:nvSpPr>
-        <p:spPr/>
-        <p:txBody>
-          <a:bodyPr/>
-          <a:lstStyle/>
-          <a:p>
-            <a:endParaRPr lang="en-US"/>
-          </a:p>
-        </p:txBody>
-      </p:sp>
-      <p:sp>
-        <p:nvSpPr>
           <p:cNvPr id="4" name="Slide Number Placeholder 3">
             <a:extLst>
               <a:ext uri="{FF2B5EF4-FFF2-40B4-BE49-F238E27FC236}">
@@ -29372,6 +30106,529 @@
           </a:p>
         </p:txBody>
       </p:sp>
+      <p:graphicFrame>
+        <p:nvGraphicFramePr>
+          <p:cNvPr id="5" name="Table 5">
+            <a:extLst>
+              <a:ext uri="{FF2B5EF4-FFF2-40B4-BE49-F238E27FC236}">
+                <a16:creationId xmlns:a16="http://schemas.microsoft.com/office/drawing/2014/main" id="{314AB95B-2495-40BD-8E1F-C50CF0452F10}"/>
+              </a:ext>
+            </a:extLst>
+          </p:cNvPr>
+          <p:cNvGraphicFramePr>
+            <a:graphicFrameLocks noGrp="1"/>
+          </p:cNvGraphicFramePr>
+          <p:nvPr>
+            <p:extLst>
+              <p:ext uri="{D42A27DB-BD31-4B8C-83A1-F6EECF244321}">
+                <p14:modId xmlns:p14="http://schemas.microsoft.com/office/powerpoint/2010/main" val="898923787"/>
+              </p:ext>
+            </p:extLst>
+          </p:nvPr>
+        </p:nvGraphicFramePr>
+        <p:xfrm>
+          <a:off x="380010" y="1537477"/>
+          <a:ext cx="8433822" cy="5012934"/>
+        </p:xfrm>
+        <a:graphic>
+          <a:graphicData uri="http://schemas.openxmlformats.org/drawingml/2006/table">
+            <a:tbl>
+              <a:tblPr firstRow="1" bandRow="1">
+                <a:tableStyleId>{5C22544A-7EE6-4342-B048-85BDC9FD1C3A}</a:tableStyleId>
+              </a:tblPr>
+              <a:tblGrid>
+                <a:gridCol w="2811274">
+                  <a:extLst>
+                    <a:ext uri="{9D8B030D-6E8A-4147-A177-3AD203B41FA5}">
+                      <a16:colId xmlns:a16="http://schemas.microsoft.com/office/drawing/2014/main" val="2651506351"/>
+                    </a:ext>
+                  </a:extLst>
+                </a:gridCol>
+                <a:gridCol w="2811274">
+                  <a:extLst>
+                    <a:ext uri="{9D8B030D-6E8A-4147-A177-3AD203B41FA5}">
+                      <a16:colId xmlns:a16="http://schemas.microsoft.com/office/drawing/2014/main" val="128541009"/>
+                    </a:ext>
+                  </a:extLst>
+                </a:gridCol>
+                <a:gridCol w="2811274">
+                  <a:extLst>
+                    <a:ext uri="{9D8B030D-6E8A-4147-A177-3AD203B41FA5}">
+                      <a16:colId xmlns:a16="http://schemas.microsoft.com/office/drawing/2014/main" val="3948716948"/>
+                    </a:ext>
+                  </a:extLst>
+                </a:gridCol>
+              </a:tblGrid>
+              <a:tr h="688141">
+                <a:tc>
+                  <a:txBody>
+                    <a:bodyPr/>
+                    <a:lstStyle/>
+                    <a:p>
+                      <a:pPr algn="ctr">
+                        <a:lnSpc>
+                          <a:spcPct val="200000"/>
+                        </a:lnSpc>
+                      </a:pPr>
+                      <a:r>
+                        <a:rPr lang="en-US" dirty="0"/>
+                        <a:t>User</a:t>
+                      </a:r>
+                    </a:p>
+                  </a:txBody>
+                  <a:tcPr/>
+                </a:tc>
+                <a:tc>
+                  <a:txBody>
+                    <a:bodyPr/>
+                    <a:lstStyle/>
+                    <a:p>
+                      <a:pPr algn="ctr">
+                        <a:lnSpc>
+                          <a:spcPct val="200000"/>
+                        </a:lnSpc>
+                      </a:pPr>
+                      <a:r>
+                        <a:rPr lang="en-US" dirty="0"/>
+                        <a:t>Agent</a:t>
+                      </a:r>
+                    </a:p>
+                  </a:txBody>
+                  <a:tcPr/>
+                </a:tc>
+                <a:tc>
+                  <a:txBody>
+                    <a:bodyPr/>
+                    <a:lstStyle/>
+                    <a:p>
+                      <a:pPr algn="ctr">
+                        <a:lnSpc>
+                          <a:spcPct val="200000"/>
+                        </a:lnSpc>
+                      </a:pPr>
+                      <a:r>
+                        <a:rPr lang="en-US" dirty="0"/>
+                        <a:t>Analyst</a:t>
+                      </a:r>
+                    </a:p>
+                  </a:txBody>
+                  <a:tcPr/>
+                </a:tc>
+                <a:extLst>
+                  <a:ext uri="{0D108BD9-81ED-4DB2-BD59-A6C34878D82A}">
+                    <a16:rowId xmlns:a16="http://schemas.microsoft.com/office/drawing/2014/main" val="547790734"/>
+                  </a:ext>
+                </a:extLst>
+              </a:tr>
+              <a:tr h="697389">
+                <a:tc>
+                  <a:txBody>
+                    <a:bodyPr/>
+                    <a:lstStyle/>
+                    <a:p>
+                      <a:pPr algn="ctr">
+                        <a:lnSpc>
+                          <a:spcPct val="200000"/>
+                        </a:lnSpc>
+                      </a:pPr>
+                      <a:r>
+                        <a:rPr lang="en-US" b="1" dirty="0">
+                          <a:latin typeface="Bahnschrift SemiBold SemiConden" panose="020B0502040204020203" pitchFamily="34" charset="0"/>
+                        </a:rPr>
+                        <a:t>Form Creation</a:t>
+                      </a:r>
+                    </a:p>
+                  </a:txBody>
+                  <a:tcPr/>
+                </a:tc>
+                <a:tc>
+                  <a:txBody>
+                    <a:bodyPr/>
+                    <a:lstStyle/>
+                    <a:p>
+                      <a:pPr algn="ctr">
+                        <a:lnSpc>
+                          <a:spcPct val="200000"/>
+                        </a:lnSpc>
+                      </a:pPr>
+                      <a:r>
+                        <a:rPr lang="en-US" b="1" dirty="0">
+                          <a:latin typeface="Bahnschrift SemiBold SemiConden" panose="020B0502040204020203" pitchFamily="34" charset="0"/>
+                        </a:rPr>
+                        <a:t>Form Creation</a:t>
+                      </a:r>
+                    </a:p>
+                  </a:txBody>
+                  <a:tcPr/>
+                </a:tc>
+                <a:tc>
+                  <a:txBody>
+                    <a:bodyPr/>
+                    <a:lstStyle/>
+                    <a:p>
+                      <a:pPr algn="ctr">
+                        <a:lnSpc>
+                          <a:spcPct val="200000"/>
+                        </a:lnSpc>
+                      </a:pPr>
+                      <a:r>
+                        <a:rPr lang="en-US" b="1" dirty="0">
+                          <a:latin typeface="Bahnschrift SemiBold SemiConden" panose="020B0502040204020203" pitchFamily="34" charset="0"/>
+                        </a:rPr>
+                        <a:t>Data Gathering</a:t>
+                      </a:r>
+                    </a:p>
+                  </a:txBody>
+                  <a:tcPr/>
+                </a:tc>
+                <a:extLst>
+                  <a:ext uri="{0D108BD9-81ED-4DB2-BD59-A6C34878D82A}">
+                    <a16:rowId xmlns:a16="http://schemas.microsoft.com/office/drawing/2014/main" val="896683803"/>
+                  </a:ext>
+                </a:extLst>
+              </a:tr>
+              <a:tr h="688141">
+                <a:tc>
+                  <a:txBody>
+                    <a:bodyPr/>
+                    <a:lstStyle/>
+                    <a:p>
+                      <a:pPr algn="ctr">
+                        <a:lnSpc>
+                          <a:spcPct val="200000"/>
+                        </a:lnSpc>
+                      </a:pPr>
+                      <a:r>
+                        <a:rPr lang="en-US" b="1" dirty="0">
+                          <a:latin typeface="Bahnschrift SemiBold SemiConden" panose="020B0502040204020203" pitchFamily="34" charset="0"/>
+                        </a:rPr>
+                        <a:t>Read Only Permissions</a:t>
+                      </a:r>
+                    </a:p>
+                  </a:txBody>
+                  <a:tcPr/>
+                </a:tc>
+                <a:tc>
+                  <a:txBody>
+                    <a:bodyPr/>
+                    <a:lstStyle/>
+                    <a:p>
+                      <a:pPr algn="ctr">
+                        <a:lnSpc>
+                          <a:spcPct val="200000"/>
+                        </a:lnSpc>
+                      </a:pPr>
+                      <a:r>
+                        <a:rPr lang="en-US" b="1" dirty="0">
+                          <a:latin typeface="Bahnschrift SemiBold SemiConden" panose="020B0502040204020203" pitchFamily="34" charset="0"/>
+                        </a:rPr>
+                        <a:t>Read Only Permissions</a:t>
+                      </a:r>
+                    </a:p>
+                  </a:txBody>
+                  <a:tcPr/>
+                </a:tc>
+                <a:tc>
+                  <a:txBody>
+                    <a:bodyPr/>
+                    <a:lstStyle/>
+                    <a:p>
+                      <a:pPr algn="ctr">
+                        <a:lnSpc>
+                          <a:spcPct val="200000"/>
+                        </a:lnSpc>
+                      </a:pPr>
+                      <a:r>
+                        <a:rPr lang="en-US" b="1" dirty="0">
+                          <a:latin typeface="Bahnschrift SemiBold SemiConden" panose="020B0502040204020203" pitchFamily="34" charset="0"/>
+                        </a:rPr>
+                        <a:t>ETL Tools</a:t>
+                      </a:r>
+                    </a:p>
+                  </a:txBody>
+                  <a:tcPr/>
+                </a:tc>
+                <a:extLst>
+                  <a:ext uri="{0D108BD9-81ED-4DB2-BD59-A6C34878D82A}">
+                    <a16:rowId xmlns:a16="http://schemas.microsoft.com/office/drawing/2014/main" val="2434558614"/>
+                  </a:ext>
+                </a:extLst>
+              </a:tr>
+              <a:tr h="688141">
+                <a:tc>
+                  <a:txBody>
+                    <a:bodyPr/>
+                    <a:lstStyle/>
+                    <a:p>
+                      <a:pPr algn="ctr">
+                        <a:lnSpc>
+                          <a:spcPct val="200000"/>
+                        </a:lnSpc>
+                      </a:pPr>
+                      <a:endParaRPr lang="en-US" b="1">
+                        <a:latin typeface="Bahnschrift SemiBold SemiConden" panose="020B0502040204020203" pitchFamily="34" charset="0"/>
+                      </a:endParaRPr>
+                    </a:p>
+                  </a:txBody>
+                  <a:tcPr/>
+                </a:tc>
+                <a:tc>
+                  <a:txBody>
+                    <a:bodyPr/>
+                    <a:lstStyle/>
+                    <a:p>
+                      <a:pPr marL="0" marR="0" lvl="0" indent="0" algn="ctr" defTabSz="914400" rtl="0" eaLnBrk="1" fontAlgn="auto" latinLnBrk="0" hangingPunct="1">
+                        <a:lnSpc>
+                          <a:spcPct val="200000"/>
+                        </a:lnSpc>
+                        <a:spcBef>
+                          <a:spcPts val="0"/>
+                        </a:spcBef>
+                        <a:spcAft>
+                          <a:spcPts val="0"/>
+                        </a:spcAft>
+                        <a:buClr>
+                          <a:srgbClr val="000000"/>
+                        </a:buClr>
+                        <a:buSzTx/>
+                        <a:buFont typeface="Arial"/>
+                        <a:buNone/>
+                        <a:tabLst/>
+                        <a:defRPr/>
+                      </a:pPr>
+                      <a:r>
+                        <a:rPr lang="en-US" b="1" dirty="0">
+                          <a:latin typeface="Bahnschrift SemiBold SemiConden" panose="020B0502040204020203" pitchFamily="34" charset="0"/>
+                        </a:rPr>
+                        <a:t>Form Submission</a:t>
+                      </a:r>
+                    </a:p>
+                    <a:p>
+                      <a:pPr algn="ctr">
+                        <a:lnSpc>
+                          <a:spcPct val="200000"/>
+                        </a:lnSpc>
+                      </a:pPr>
+                      <a:endParaRPr lang="en-US" b="1" dirty="0">
+                        <a:latin typeface="Bahnschrift SemiBold SemiConden" panose="020B0502040204020203" pitchFamily="34" charset="0"/>
+                      </a:endParaRPr>
+                    </a:p>
+                  </a:txBody>
+                  <a:tcPr/>
+                </a:tc>
+                <a:tc>
+                  <a:txBody>
+                    <a:bodyPr/>
+                    <a:lstStyle/>
+                    <a:p>
+                      <a:pPr algn="ctr">
+                        <a:lnSpc>
+                          <a:spcPct val="200000"/>
+                        </a:lnSpc>
+                      </a:pPr>
+                      <a:r>
+                        <a:rPr lang="en-US" b="1" dirty="0">
+                          <a:latin typeface="Bahnschrift SemiBold SemiConden" panose="020B0502040204020203" pitchFamily="34" charset="0"/>
+                        </a:rPr>
+                        <a:t>Graphical Visualization</a:t>
+                      </a:r>
+                    </a:p>
+                  </a:txBody>
+                  <a:tcPr/>
+                </a:tc>
+                <a:extLst>
+                  <a:ext uri="{0D108BD9-81ED-4DB2-BD59-A6C34878D82A}">
+                    <a16:rowId xmlns:a16="http://schemas.microsoft.com/office/drawing/2014/main" val="2283704344"/>
+                  </a:ext>
+                </a:extLst>
+              </a:tr>
+              <a:tr h="688141">
+                <a:tc>
+                  <a:txBody>
+                    <a:bodyPr/>
+                    <a:lstStyle/>
+                    <a:p>
+                      <a:pPr algn="ctr">
+                        <a:lnSpc>
+                          <a:spcPct val="200000"/>
+                        </a:lnSpc>
+                      </a:pPr>
+                      <a:endParaRPr lang="en-US" b="1">
+                        <a:latin typeface="Bahnschrift SemiBold SemiConden" panose="020B0502040204020203" pitchFamily="34" charset="0"/>
+                      </a:endParaRPr>
+                    </a:p>
+                  </a:txBody>
+                  <a:tcPr/>
+                </a:tc>
+                <a:tc>
+                  <a:txBody>
+                    <a:bodyPr/>
+                    <a:lstStyle/>
+                    <a:p>
+                      <a:pPr algn="ctr">
+                        <a:lnSpc>
+                          <a:spcPct val="200000"/>
+                        </a:lnSpc>
+                      </a:pPr>
+                      <a:endParaRPr lang="en-US" b="1" dirty="0">
+                        <a:latin typeface="Bahnschrift SemiBold SemiConden" panose="020B0502040204020203" pitchFamily="34" charset="0"/>
+                      </a:endParaRPr>
+                    </a:p>
+                  </a:txBody>
+                  <a:tcPr/>
+                </a:tc>
+                <a:tc>
+                  <a:txBody>
+                    <a:bodyPr/>
+                    <a:lstStyle/>
+                    <a:p>
+                      <a:pPr algn="ctr">
+                        <a:lnSpc>
+                          <a:spcPct val="200000"/>
+                        </a:lnSpc>
+                      </a:pPr>
+                      <a:r>
+                        <a:rPr lang="en-US" b="1" dirty="0">
+                          <a:latin typeface="Bahnschrift SemiBold SemiConden" panose="020B0502040204020203" pitchFamily="34" charset="0"/>
+                        </a:rPr>
+                        <a:t>Parameter Control</a:t>
+                      </a:r>
+                    </a:p>
+                  </a:txBody>
+                  <a:tcPr/>
+                </a:tc>
+                <a:extLst>
+                  <a:ext uri="{0D108BD9-81ED-4DB2-BD59-A6C34878D82A}">
+                    <a16:rowId xmlns:a16="http://schemas.microsoft.com/office/drawing/2014/main" val="2367943128"/>
+                  </a:ext>
+                </a:extLst>
+              </a:tr>
+              <a:tr h="688141">
+                <a:tc>
+                  <a:txBody>
+                    <a:bodyPr/>
+                    <a:lstStyle/>
+                    <a:p>
+                      <a:pPr algn="ctr">
+                        <a:lnSpc>
+                          <a:spcPct val="200000"/>
+                        </a:lnSpc>
+                      </a:pPr>
+                      <a:endParaRPr lang="en-US" b="1">
+                        <a:latin typeface="Bahnschrift SemiBold SemiConden" panose="020B0502040204020203" pitchFamily="34" charset="0"/>
+                      </a:endParaRPr>
+                    </a:p>
+                  </a:txBody>
+                  <a:tcPr/>
+                </a:tc>
+                <a:tc>
+                  <a:txBody>
+                    <a:bodyPr/>
+                    <a:lstStyle/>
+                    <a:p>
+                      <a:pPr algn="ctr">
+                        <a:lnSpc>
+                          <a:spcPct val="200000"/>
+                        </a:lnSpc>
+                      </a:pPr>
+                      <a:endParaRPr lang="en-US" b="1">
+                        <a:latin typeface="Bahnschrift SemiBold SemiConden" panose="020B0502040204020203" pitchFamily="34" charset="0"/>
+                      </a:endParaRPr>
+                    </a:p>
+                  </a:txBody>
+                  <a:tcPr/>
+                </a:tc>
+                <a:tc>
+                  <a:txBody>
+                    <a:bodyPr/>
+                    <a:lstStyle/>
+                    <a:p>
+                      <a:pPr algn="ctr">
+                        <a:lnSpc>
+                          <a:spcPct val="200000"/>
+                        </a:lnSpc>
+                      </a:pPr>
+                      <a:r>
+                        <a:rPr lang="en-US" b="1" dirty="0">
+                          <a:latin typeface="Bahnschrift SemiBold SemiConden" panose="020B0502040204020203" pitchFamily="34" charset="0"/>
+                        </a:rPr>
+                        <a:t>Transaction Management</a:t>
+                      </a:r>
+                    </a:p>
+                  </a:txBody>
+                  <a:tcPr/>
+                </a:tc>
+                <a:extLst>
+                  <a:ext uri="{0D108BD9-81ED-4DB2-BD59-A6C34878D82A}">
+                    <a16:rowId xmlns:a16="http://schemas.microsoft.com/office/drawing/2014/main" val="1222393221"/>
+                  </a:ext>
+                </a:extLst>
+              </a:tr>
+              <a:tr h="688141">
+                <a:tc>
+                  <a:txBody>
+                    <a:bodyPr/>
+                    <a:lstStyle/>
+                    <a:p>
+                      <a:pPr algn="ctr">
+                        <a:lnSpc>
+                          <a:spcPct val="200000"/>
+                        </a:lnSpc>
+                      </a:pPr>
+                      <a:endParaRPr lang="en-US" b="1">
+                        <a:latin typeface="Bahnschrift SemiBold SemiConden" panose="020B0502040204020203" pitchFamily="34" charset="0"/>
+                      </a:endParaRPr>
+                    </a:p>
+                  </a:txBody>
+                  <a:tcPr/>
+                </a:tc>
+                <a:tc>
+                  <a:txBody>
+                    <a:bodyPr/>
+                    <a:lstStyle/>
+                    <a:p>
+                      <a:pPr algn="ctr">
+                        <a:lnSpc>
+                          <a:spcPct val="200000"/>
+                        </a:lnSpc>
+                      </a:pPr>
+                      <a:endParaRPr lang="en-US" b="1" dirty="0">
+                        <a:latin typeface="Bahnschrift SemiBold SemiConden" panose="020B0502040204020203" pitchFamily="34" charset="0"/>
+                      </a:endParaRPr>
+                    </a:p>
+                  </a:txBody>
+                  <a:tcPr/>
+                </a:tc>
+                <a:tc>
+                  <a:txBody>
+                    <a:bodyPr/>
+                    <a:lstStyle/>
+                    <a:p>
+                      <a:pPr algn="ctr">
+                        <a:lnSpc>
+                          <a:spcPct val="200000"/>
+                        </a:lnSpc>
+                      </a:pPr>
+                      <a:r>
+                        <a:rPr lang="en-US" b="1" dirty="0">
+                          <a:latin typeface="Bahnschrift SemiBold SemiConden" panose="020B0502040204020203" pitchFamily="34" charset="0"/>
+                        </a:rPr>
+                        <a:t>RDS Management </a:t>
+                      </a:r>
+                    </a:p>
+                  </a:txBody>
+                  <a:tcPr/>
+                </a:tc>
+                <a:extLst>
+                  <a:ext uri="{0D108BD9-81ED-4DB2-BD59-A6C34878D82A}">
+                    <a16:rowId xmlns:a16="http://schemas.microsoft.com/office/drawing/2014/main" val="2244363353"/>
+                  </a:ext>
+                </a:extLst>
+              </a:tr>
+            </a:tbl>
+          </a:graphicData>
+        </a:graphic>
+      </p:graphicFrame>
     </p:spTree>
     <p:extLst>
       <p:ext uri="{BB962C8B-B14F-4D97-AF65-F5344CB8AC3E}">
@@ -29579,6 +30836,43 @@
           </a:prstGeom>
         </p:spPr>
       </p:pic>
+      <p:sp>
+        <p:nvSpPr>
+          <p:cNvPr id="5" name="TextBox 4">
+            <a:extLst>
+              <a:ext uri="{FF2B5EF4-FFF2-40B4-BE49-F238E27FC236}">
+                <a16:creationId xmlns:a16="http://schemas.microsoft.com/office/drawing/2014/main" id="{970A58EF-23D0-4071-BAC6-241FA25C16F4}"/>
+              </a:ext>
+            </a:extLst>
+          </p:cNvPr>
+          <p:cNvSpPr txBox="1"/>
+          <p:nvPr/>
+        </p:nvSpPr>
+        <p:spPr>
+          <a:xfrm>
+            <a:off x="5390203" y="6209823"/>
+            <a:ext cx="2774009" cy="307777"/>
+          </a:xfrm>
+          <a:prstGeom prst="rect">
+            <a:avLst/>
+          </a:prstGeom>
+          <a:noFill/>
+        </p:spPr>
+        <p:txBody>
+          <a:bodyPr wrap="square" rtlCol="0">
+            <a:spAutoFit/>
+          </a:bodyPr>
+          <a:lstStyle/>
+          <a:p>
+            <a:r>
+              <a:rPr lang="en-US" dirty="0">
+                <a:latin typeface="Bahnschrift Light" panose="020B0502040204020203" pitchFamily="34" charset="0"/>
+              </a:rPr>
+              <a:t>Image 7.1 - Agile Framework</a:t>
+            </a:r>
+          </a:p>
+        </p:txBody>
+      </p:sp>
     </p:spTree>
     <p:extLst>
       <p:ext uri="{BB962C8B-B14F-4D97-AF65-F5344CB8AC3E}">
@@ -29859,7 +31153,7 @@
         <p:spPr>
           <a:xfrm>
             <a:off x="252449" y="5047668"/>
-            <a:ext cx="3356514" cy="954107"/>
+            <a:ext cx="3356514" cy="1169551"/>
           </a:xfrm>
           <a:prstGeom prst="rect">
             <a:avLst/>
@@ -29874,7 +31168,7 @@
           <a:p>
             <a:r>
               <a:rPr lang="en-US" dirty="0"/>
-              <a:t>Table 8.2 (right) are unique schemas inside our DBeaver constructed to answer specific questions and gather specific business intelligence data.</a:t>
+              <a:t>Table 8.2 (right) are unique schemas inside our DBeaver constructed to answer specific questions and gather specific business intelligence data in Snowflake schema form.</a:t>
             </a:r>
           </a:p>
         </p:txBody>

</xml_diff>